<commit_message>
final submission for IBM DS Capstone Project
</commit_message>
<xml_diff>
--- a/Presentation.pptx
+++ b/Presentation.pptx
@@ -11,7 +11,8 @@
     <p:sldId id="301" r:id="rId8"/>
     <p:sldId id="298" r:id="rId9"/>
     <p:sldId id="299" r:id="rId10"/>
-    <p:sldId id="300" r:id="rId11"/>
+    <p:sldId id="302" r:id="rId11"/>
+    <p:sldId id="300" r:id="rId12"/>
   </p:sldIdLst>
   <p:sldSz cx="12192000" cy="6858000"/>
   <p:notesSz cx="6858000" cy="9144000"/>
@@ -587,7 +588,7 @@
           <a:p>
             <a:fld id="{EA0C0817-A112-4847-8014-A94B7D2A4EA3}" type="datetime1">
               <a:rPr lang="en-US" smtClean="0"/>
-              <a:t>1/25/2021</a:t>
+              <a:t>1/26/2021</a:t>
             </a:fld>
             <a:endParaRPr lang="en-US" dirty="0"/>
           </a:p>
@@ -789,7 +790,7 @@
           <a:p>
             <a:fld id="{134F40B7-36AB-4376-BE14-EF7004D79BB9}" type="datetime1">
               <a:rPr lang="en-US" smtClean="0"/>
-              <a:t>1/25/2021</a:t>
+              <a:t>1/26/2021</a:t>
             </a:fld>
             <a:endParaRPr lang="en-US" dirty="0"/>
           </a:p>
@@ -969,7 +970,7 @@
           <a:p>
             <a:fld id="{FF87CAB8-DCAE-46A5-AADA-B3FAD11A54E0}" type="datetime1">
               <a:rPr lang="en-US" smtClean="0"/>
-              <a:t>1/25/2021</a:t>
+              <a:t>1/26/2021</a:t>
             </a:fld>
             <a:endParaRPr lang="en-US" dirty="0"/>
           </a:p>
@@ -1139,7 +1140,7 @@
           <a:p>
             <a:fld id="{7332B432-ACDA-4023-A761-2BAB76577B62}" type="datetime1">
               <a:rPr lang="en-US" smtClean="0"/>
-              <a:t>1/25/2021</a:t>
+              <a:t>1/26/2021</a:t>
             </a:fld>
             <a:endParaRPr lang="en-US" dirty="0"/>
           </a:p>
@@ -1738,7 +1739,7 @@
           <a:p>
             <a:fld id="{D9C646AA-F36E-4540-911D-FFFC0A0EF24A}" type="datetime1">
               <a:rPr lang="en-US" smtClean="0"/>
-              <a:t>1/25/2021</a:t>
+              <a:t>1/26/2021</a:t>
             </a:fld>
             <a:endParaRPr lang="en-US" dirty="0"/>
           </a:p>
@@ -2058,7 +2059,7 @@
           <a:p>
             <a:fld id="{69186D26-FA5F-4637-B602-B7C2DC34CFD4}" type="datetime1">
               <a:rPr lang="en-US" smtClean="0"/>
-              <a:t>1/25/2021</a:t>
+              <a:t>1/26/2021</a:t>
             </a:fld>
             <a:endParaRPr lang="en-US" dirty="0"/>
           </a:p>
@@ -2495,7 +2496,7 @@
           <a:p>
             <a:fld id="{8A7F15D8-96D1-4781-BC50-CA8A088B2FE4}" type="datetime1">
               <a:rPr lang="en-US" smtClean="0"/>
-              <a:t>1/25/2021</a:t>
+              <a:t>1/26/2021</a:t>
             </a:fld>
             <a:endParaRPr lang="en-US" dirty="0"/>
           </a:p>
@@ -2613,7 +2614,7 @@
           <a:p>
             <a:fld id="{F9A96C99-B8F8-4528-BD05-0E16E943DC09}" type="datetime1">
               <a:rPr lang="en-US" smtClean="0"/>
-              <a:t>1/25/2021</a:t>
+              <a:t>1/26/2021</a:t>
             </a:fld>
             <a:endParaRPr lang="en-US" dirty="0"/>
           </a:p>
@@ -2708,7 +2709,7 @@
           <a:p>
             <a:fld id="{03636942-C211-4B28-8DBD-C953E00AF71B}" type="datetime1">
               <a:rPr lang="en-US" smtClean="0"/>
-              <a:t>1/25/2021</a:t>
+              <a:t>1/26/2021</a:t>
             </a:fld>
             <a:endParaRPr lang="en-US" dirty="0"/>
           </a:p>
@@ -3125,7 +3126,7 @@
           <a:p>
             <a:fld id="{7E8D12A6-918A-48BD-8CB9-CA713993B0EA}" type="datetime1">
               <a:rPr lang="en-US" smtClean="0"/>
-              <a:t>1/25/2021</a:t>
+              <a:t>1/26/2021</a:t>
             </a:fld>
             <a:endParaRPr lang="en-US" dirty="0"/>
           </a:p>
@@ -3387,7 +3388,7 @@
             <a:fld id="{E778CE86-875F-4587-BCF6-FA054AFC0D53}" type="datetime1">
               <a:rPr lang="en-US" smtClean="0"/>
               <a:pPr/>
-              <a:t>1/25/2021</a:t>
+              <a:t>1/26/2021</a:t>
             </a:fld>
             <a:endParaRPr lang="en-US" dirty="0"/>
           </a:p>
@@ -3903,7 +3904,7 @@
           <a:p>
             <a:fld id="{F6FA2B21-3FCD-4721-B95C-427943F61125}" type="datetime1">
               <a:rPr lang="en-US" smtClean="0"/>
-              <a:t>1/25/2021</a:t>
+              <a:t>1/26/2021</a:t>
             </a:fld>
             <a:endParaRPr lang="en-US" dirty="0"/>
           </a:p>
@@ -5189,7 +5190,7 @@
                 <a:ea typeface="DengXian" panose="02010600030101010101" pitchFamily="2" charset="-122"/>
                 <a:cs typeface="Times New Roman" panose="02020603050405020304" pitchFamily="18" charset="0"/>
               </a:rPr>
-              <a:t>Use K = </a:t>
+              <a:t>Use K = 5</a:t>
             </a:r>
             <a:endParaRPr lang="en-PH" sz="1800" dirty="0">
               <a:effectLst/>
@@ -5203,6 +5204,34 @@
           </a:p>
         </p:txBody>
       </p:sp>
+      <p:pic>
+        <p:nvPicPr>
+          <p:cNvPr id="4" name="Picture 3">
+            <a:extLst>
+              <a:ext uri="{FF2B5EF4-FFF2-40B4-BE49-F238E27FC236}">
+                <a16:creationId xmlns:a16="http://schemas.microsoft.com/office/drawing/2014/main" id="{FBB1022D-4ECE-4A17-8C8F-9638039F4A66}"/>
+              </a:ext>
+            </a:extLst>
+          </p:cNvPr>
+          <p:cNvPicPr/>
+          <p:nvPr/>
+        </p:nvPicPr>
+        <p:blipFill>
+          <a:blip r:embed="rId2"/>
+          <a:stretch>
+            <a:fillRect/>
+          </a:stretch>
+        </p:blipFill>
+        <p:spPr>
+          <a:xfrm>
+            <a:off x="1323370" y="1823502"/>
+            <a:ext cx="6393273" cy="4083003"/>
+          </a:xfrm>
+          <a:prstGeom prst="rect">
+            <a:avLst/>
+          </a:prstGeom>
+        </p:spPr>
+      </p:pic>
     </p:spTree>
     <p:extLst>
       <p:ext uri="{BB962C8B-B14F-4D97-AF65-F5344CB8AC3E}">
@@ -5277,7 +5306,12 @@
             <p:ph idx="1"/>
           </p:nvPr>
         </p:nvSpPr>
-        <p:spPr/>
+        <p:spPr>
+          <a:xfrm>
+            <a:off x="1066800" y="2103120"/>
+            <a:ext cx="6569034" cy="3849624"/>
+          </a:xfrm>
+        </p:spPr>
         <p:txBody>
           <a:bodyPr>
             <a:normAutofit/>
@@ -5302,7 +5336,7 @@
                 <a:ea typeface="Times New Roman" panose="02020603050405020304" pitchFamily="18" charset="0"/>
                 <a:cs typeface="Times New Roman" panose="02020603050405020304" pitchFamily="18" charset="0"/>
               </a:rPr>
-              <a:t>Insert relevant points and figures here</a:t>
+              <a:t>As we are looking to enter areas packed with Coffee Shops, Cafés, or Tea Rooms, as they complement our products, and with minimal competition, Cluster 3 is of interest</a:t>
             </a:r>
             <a:endParaRPr lang="en-PH" sz="1800" dirty="0">
               <a:effectLst/>
@@ -5311,11 +5345,36 @@
               <a:cs typeface="Times New Roman" panose="02020603050405020304" pitchFamily="18" charset="0"/>
             </a:endParaRPr>
           </a:p>
-          <a:p>
-            <a:endParaRPr lang="en-PH" dirty="0"/>
-          </a:p>
-        </p:txBody>
-      </p:sp>
+        </p:txBody>
+      </p:sp>
+      <p:pic>
+        <p:nvPicPr>
+          <p:cNvPr id="4" name="Picture 3">
+            <a:extLst>
+              <a:ext uri="{FF2B5EF4-FFF2-40B4-BE49-F238E27FC236}">
+                <a16:creationId xmlns:a16="http://schemas.microsoft.com/office/drawing/2014/main" id="{E8F3CA50-FF81-436D-9068-E21D148AB73C}"/>
+              </a:ext>
+            </a:extLst>
+          </p:cNvPr>
+          <p:cNvPicPr/>
+          <p:nvPr/>
+        </p:nvPicPr>
+        <p:blipFill>
+          <a:blip r:embed="rId2"/>
+          <a:stretch>
+            <a:fillRect/>
+          </a:stretch>
+        </p:blipFill>
+        <p:spPr>
+          <a:xfrm>
+            <a:off x="7875836" y="1555668"/>
+            <a:ext cx="2895082" cy="4860879"/>
+          </a:xfrm>
+          <a:prstGeom prst="rect">
+            <a:avLst/>
+          </a:prstGeom>
+        </p:spPr>
+      </p:pic>
     </p:spTree>
     <p:extLst>
       <p:ext uri="{BB962C8B-B14F-4D97-AF65-F5344CB8AC3E}">
@@ -5369,7 +5428,7 @@
           <a:p>
             <a:r>
               <a:rPr lang="en-PH" dirty="0"/>
-              <a:t>Zero in on clusters with dense coffee shop or café presence</a:t>
+              <a:t>Keep an eye on competition from Runnymede</a:t>
             </a:r>
           </a:p>
         </p:txBody>
@@ -5428,6 +5487,62 @@
           </a:p>
         </p:txBody>
       </p:sp>
+      <p:pic>
+        <p:nvPicPr>
+          <p:cNvPr id="4" name="Picture 3">
+            <a:extLst>
+              <a:ext uri="{FF2B5EF4-FFF2-40B4-BE49-F238E27FC236}">
+                <a16:creationId xmlns:a16="http://schemas.microsoft.com/office/drawing/2014/main" id="{C9E08C1B-6C9D-4248-86E3-9FDB96E32315}"/>
+              </a:ext>
+            </a:extLst>
+          </p:cNvPr>
+          <p:cNvPicPr/>
+          <p:nvPr/>
+        </p:nvPicPr>
+        <p:blipFill>
+          <a:blip r:embed="rId2"/>
+          <a:stretch>
+            <a:fillRect/>
+          </a:stretch>
+        </p:blipFill>
+        <p:spPr>
+          <a:xfrm>
+            <a:off x="618744" y="2125371"/>
+            <a:ext cx="5561902" cy="3827373"/>
+          </a:xfrm>
+          <a:prstGeom prst="rect">
+            <a:avLst/>
+          </a:prstGeom>
+        </p:spPr>
+      </p:pic>
+      <p:pic>
+        <p:nvPicPr>
+          <p:cNvPr id="5" name="Picture 4">
+            <a:extLst>
+              <a:ext uri="{FF2B5EF4-FFF2-40B4-BE49-F238E27FC236}">
+                <a16:creationId xmlns:a16="http://schemas.microsoft.com/office/drawing/2014/main" id="{B51E02B6-C95D-4150-A69F-ACDFE5B735DD}"/>
+              </a:ext>
+            </a:extLst>
+          </p:cNvPr>
+          <p:cNvPicPr/>
+          <p:nvPr/>
+        </p:nvPicPr>
+        <p:blipFill>
+          <a:blip r:embed="rId3"/>
+          <a:stretch>
+            <a:fillRect/>
+          </a:stretch>
+        </p:blipFill>
+        <p:spPr>
+          <a:xfrm>
+            <a:off x="6320486" y="2125370"/>
+            <a:ext cx="5536552" cy="3827374"/>
+          </a:xfrm>
+          <a:prstGeom prst="rect">
+            <a:avLst/>
+          </a:prstGeom>
+        </p:spPr>
+      </p:pic>
     </p:spTree>
     <p:extLst>
       <p:ext uri="{BB962C8B-B14F-4D97-AF65-F5344CB8AC3E}">
@@ -5481,7 +5596,7 @@
           <a:p>
             <a:r>
               <a:rPr lang="en-PH" dirty="0"/>
-              <a:t>Recommendation and future directions</a:t>
+              <a:t>Keep an eye on competition from Runnymede</a:t>
             </a:r>
           </a:p>
         </p:txBody>
@@ -5502,10 +5617,155 @@
             <p:ph idx="1"/>
           </p:nvPr>
         </p:nvSpPr>
-        <p:spPr/>
+        <p:spPr>
+          <a:xfrm>
+            <a:off x="1066800" y="2103120"/>
+            <a:ext cx="3583259" cy="3849624"/>
+          </a:xfrm>
+        </p:spPr>
         <p:txBody>
           <a:bodyPr>
             <a:normAutofit/>
+          </a:bodyPr>
+          <a:lstStyle/>
+          <a:p>
+            <a:pPr marL="457200" indent="457200">
+              <a:lnSpc>
+                <a:spcPct val="107000"/>
+              </a:lnSpc>
+              <a:spcAft>
+                <a:spcPts val="800"/>
+              </a:spcAft>
+            </a:pPr>
+            <a:r>
+              <a:rPr lang="en-PH" sz="1800" dirty="0">
+                <a:solidFill>
+                  <a:srgbClr val="000000"/>
+                </a:solidFill>
+                <a:latin typeface="Arial" panose="020B0604020202020204" pitchFamily="34" charset="0"/>
+                <a:ea typeface="DengXian" panose="02010600030101010101" pitchFamily="2" charset="-122"/>
+                <a:cs typeface="Times New Roman" panose="02020603050405020304" pitchFamily="18" charset="0"/>
+              </a:rPr>
+              <a:t>Dense presence of coffee shops, cafes, bakeries in Runnymede</a:t>
+            </a:r>
+            <a:endParaRPr lang="en-PH" sz="1800" dirty="0">
+              <a:effectLst/>
+              <a:latin typeface="Calibri" panose="020F0502020204030204" pitchFamily="34" charset="0"/>
+              <a:ea typeface="DengXian" panose="02010600030101010101" pitchFamily="2" charset="-122"/>
+              <a:cs typeface="Times New Roman" panose="02020603050405020304" pitchFamily="18" charset="0"/>
+            </a:endParaRPr>
+          </a:p>
+          <a:p>
+            <a:endParaRPr lang="en-PH" dirty="0"/>
+          </a:p>
+        </p:txBody>
+      </p:sp>
+      <p:pic>
+        <p:nvPicPr>
+          <p:cNvPr id="6" name="Picture 5">
+            <a:extLst>
+              <a:ext uri="{FF2B5EF4-FFF2-40B4-BE49-F238E27FC236}">
+                <a16:creationId xmlns:a16="http://schemas.microsoft.com/office/drawing/2014/main" id="{04766702-8689-4FA7-9AA8-0DB51043BD80}"/>
+              </a:ext>
+            </a:extLst>
+          </p:cNvPr>
+          <p:cNvPicPr/>
+          <p:nvPr/>
+        </p:nvPicPr>
+        <p:blipFill>
+          <a:blip r:embed="rId2"/>
+          <a:stretch>
+            <a:fillRect/>
+          </a:stretch>
+        </p:blipFill>
+        <p:spPr>
+          <a:xfrm>
+            <a:off x="4839125" y="1575943"/>
+            <a:ext cx="6691236" cy="4639463"/>
+          </a:xfrm>
+          <a:prstGeom prst="rect">
+            <a:avLst/>
+          </a:prstGeom>
+        </p:spPr>
+      </p:pic>
+    </p:spTree>
+    <p:extLst>
+      <p:ext uri="{BB962C8B-B14F-4D97-AF65-F5344CB8AC3E}">
+        <p14:creationId xmlns:p14="http://schemas.microsoft.com/office/powerpoint/2010/main" val="2166083595"/>
+      </p:ext>
+    </p:extLst>
+  </p:cSld>
+  <p:clrMapOvr>
+    <a:masterClrMapping/>
+  </p:clrMapOvr>
+</p:sld>
+</file>
+
+<file path=ppt/slides/slide8.xml><?xml version="1.0" encoding="utf-8"?>
+<p:sld xmlns:a="http://schemas.openxmlformats.org/drawingml/2006/main" xmlns:r="http://schemas.openxmlformats.org/officeDocument/2006/relationships" xmlns:p="http://schemas.openxmlformats.org/presentationml/2006/main">
+  <p:cSld>
+    <p:spTree>
+      <p:nvGrpSpPr>
+        <p:cNvPr id="1" name=""/>
+        <p:cNvGrpSpPr/>
+        <p:nvPr/>
+      </p:nvGrpSpPr>
+      <p:grpSpPr>
+        <a:xfrm>
+          <a:off x="0" y="0"/>
+          <a:ext cx="0" cy="0"/>
+          <a:chOff x="0" y="0"/>
+          <a:chExt cx="0" cy="0"/>
+        </a:xfrm>
+      </p:grpSpPr>
+      <p:sp>
+        <p:nvSpPr>
+          <p:cNvPr id="2" name="Title 1">
+            <a:extLst>
+              <a:ext uri="{FF2B5EF4-FFF2-40B4-BE49-F238E27FC236}">
+                <a16:creationId xmlns:a16="http://schemas.microsoft.com/office/drawing/2014/main" id="{288633BE-F323-4966-8380-3E0A80B64F99}"/>
+              </a:ext>
+            </a:extLst>
+          </p:cNvPr>
+          <p:cNvSpPr>
+            <a:spLocks noGrp="1"/>
+          </p:cNvSpPr>
+          <p:nvPr>
+            <p:ph type="title"/>
+          </p:nvPr>
+        </p:nvSpPr>
+        <p:spPr/>
+        <p:txBody>
+          <a:bodyPr/>
+          <a:lstStyle/>
+          <a:p>
+            <a:r>
+              <a:rPr lang="en-PH" dirty="0"/>
+              <a:t>Recommendation and future directions</a:t>
+            </a:r>
+          </a:p>
+        </p:txBody>
+      </p:sp>
+      <p:sp>
+        <p:nvSpPr>
+          <p:cNvPr id="3" name="Content Placeholder 2">
+            <a:extLst>
+              <a:ext uri="{FF2B5EF4-FFF2-40B4-BE49-F238E27FC236}">
+                <a16:creationId xmlns:a16="http://schemas.microsoft.com/office/drawing/2014/main" id="{BB95308C-9C7B-440D-91C4-AB431621EA91}"/>
+              </a:ext>
+            </a:extLst>
+          </p:cNvPr>
+          <p:cNvSpPr>
+            <a:spLocks noGrp="1"/>
+          </p:cNvSpPr>
+          <p:nvPr>
+            <p:ph idx="1"/>
+          </p:nvPr>
+        </p:nvSpPr>
+        <p:spPr/>
+        <p:txBody>
+          <a:bodyPr>
+            <a:normAutofit fontScale="92500" lnSpcReduction="20000"/>
           </a:bodyPr>
           <a:lstStyle/>
           <a:p>
@@ -5535,8 +5795,29 @@
             </a:pPr>
             <a:r>
               <a:rPr lang="en-US" sz="1800" dirty="0"/>
-              <a:t>Include suggested locations here</a:t>
-            </a:r>
+              <a:t>Explore Cluster 3 neighborhoods, specifically: Oriole, Queen's Park, East Toronto, Mount Dennis, North Park, St Phillips, Martin Grove Gardens, Scarborough Village, Scarborough Village West, The Queensway East, Jamestown</a:t>
+            </a:r>
+          </a:p>
+          <a:p>
+            <a:pPr marL="1017270" lvl="1" indent="-285750">
+              <a:lnSpc>
+                <a:spcPct val="107000"/>
+              </a:lnSpc>
+              <a:spcAft>
+                <a:spcPts val="800"/>
+              </a:spcAft>
+              <a:buFont typeface="Wingdings" panose="05000000000000000000" pitchFamily="2" charset="2"/>
+              <a:buChar char="§"/>
+            </a:pPr>
+            <a:r>
+              <a:rPr lang="en-US" sz="1800" dirty="0"/>
+              <a:t>Further validate the situation in the </a:t>
+            </a:r>
+            <a:r>
+              <a:rPr lang="en-US" sz="1800"/>
+              <a:t>neighborhoods above</a:t>
+            </a:r>
+            <a:endParaRPr lang="en-US" sz="1800" dirty="0"/>
           </a:p>
           <a:p>
             <a:pPr marL="457200" indent="457200">
@@ -5935,21 +6216,21 @@
 </file>
 
 <file path=customXml/item1.xml><?xml version="1.0" encoding="utf-8"?>
+<?mso-contentType ?>
+<FormTemplates xmlns="http://schemas.microsoft.com/sharepoint/v3/contenttype/forms">
+  <Display>DocumentLibraryForm</Display>
+  <Edit>DocumentLibraryForm</Edit>
+  <New>DocumentLibraryForm</New>
+</FormTemplates>
+</file>
+
+<file path=customXml/item2.xml><?xml version="1.0" encoding="utf-8"?>
 <p:properties xmlns:p="http://schemas.microsoft.com/office/2006/metadata/properties" xmlns:xsi="http://www.w3.org/2001/XMLSchema-instance" xmlns:pc="http://schemas.microsoft.com/office/infopath/2007/PartnerControls">
   <documentManagement>
     <Status xmlns="71af3243-3dd4-4a8d-8c0d-dd76da1f02a5">Not started</Status>
     <MediaServiceKeyPoints xmlns="71af3243-3dd4-4a8d-8c0d-dd76da1f02a5" xsi:nil="true"/>
   </documentManagement>
 </p:properties>
-</file>
-
-<file path=customXml/item2.xml><?xml version="1.0" encoding="utf-8"?>
-<?mso-contentType ?>
-<FormTemplates xmlns="http://schemas.microsoft.com/sharepoint/v3/contenttype/forms">
-  <Display>DocumentLibraryForm</Display>
-  <Edit>DocumentLibraryForm</Edit>
-  <New>DocumentLibraryForm</New>
-</FormTemplates>
 </file>
 
 <file path=customXml/item3.xml><?xml version="1.0" encoding="utf-8"?>
@@ -6174,19 +6455,19 @@
 </file>
 
 <file path=customXml/itemProps1.xml><?xml version="1.0" encoding="utf-8"?>
+<ds:datastoreItem xmlns:ds="http://schemas.openxmlformats.org/officeDocument/2006/customXml" ds:itemID="{294F055B-D391-44D3-A87A-BCD07BD5A31C}">
+  <ds:schemaRefs>
+    <ds:schemaRef ds:uri="http://schemas.microsoft.com/sharepoint/v3/contenttype/forms"/>
+  </ds:schemaRefs>
+</ds:datastoreItem>
+</file>
+
+<file path=customXml/itemProps2.xml><?xml version="1.0" encoding="utf-8"?>
 <ds:datastoreItem xmlns:ds="http://schemas.openxmlformats.org/officeDocument/2006/customXml" ds:itemID="{B975FBC4-9D33-46BE-911D-419763BA9AF9}">
   <ds:schemaRefs>
     <ds:schemaRef ds:uri="http://schemas.microsoft.com/office/2006/metadata/properties"/>
     <ds:schemaRef ds:uri="http://schemas.microsoft.com/office/infopath/2007/PartnerControls"/>
     <ds:schemaRef ds:uri="71af3243-3dd4-4a8d-8c0d-dd76da1f02a5"/>
-  </ds:schemaRefs>
-</ds:datastoreItem>
-</file>
-
-<file path=customXml/itemProps2.xml><?xml version="1.0" encoding="utf-8"?>
-<ds:datastoreItem xmlns:ds="http://schemas.openxmlformats.org/officeDocument/2006/customXml" ds:itemID="{294F055B-D391-44D3-A87A-BCD07BD5A31C}">
-  <ds:schemaRefs>
-    <ds:schemaRef ds:uri="http://schemas.microsoft.com/sharepoint/v3/contenttype/forms"/>
   </ds:schemaRefs>
 </ds:datastoreItem>
 </file>

</xml_diff>